<commit_message>
updated the group presentation slides
</commit_message>
<xml_diff>
--- a/presentations/2021-02-Fermi_prob_catalog_gamma_group.pptx
+++ b/presentations/2021-02-Fermi_prob_catalog_gamma_group.pptx
@@ -273,7 +273,7 @@
             <a:fld id="{3189ADB2-8830-3E4F-9C21-386BBEFF5ECC}" type="datetimeFigureOut">
               <a:rPr lang="en-US" smtClean="0"/>
               <a:pPr/>
-              <a:t>2/22/21</a:t>
+              <a:t>2/24/21</a:t>
             </a:fld>
             <a:endParaRPr lang="en-US"/>
           </a:p>
@@ -441,7 +441,7 @@
             <a:fld id="{C85F260B-6123-154B-904A-A1AB92F0D5FE}" type="datetimeFigureOut">
               <a:rPr lang="en-US" smtClean="0"/>
               <a:pPr/>
-              <a:t>2/22/21</a:t>
+              <a:t>2/24/21</a:t>
             </a:fld>
             <a:endParaRPr lang="en-US"/>
           </a:p>
@@ -1161,7 +1161,7 @@
           <a:p>
             <a:fld id="{103471C4-0DF0-FF4F-BCCC-44D2780D953F}" type="datetime1">
               <a:rPr lang="en-US" smtClean="0"/>
-              <a:t>2/22/21</a:t>
+              <a:t>2/24/21</a:t>
             </a:fld>
             <a:endParaRPr lang="en-US"/>
           </a:p>
@@ -1607,7 +1607,7 @@
           <a:p>
             <a:fld id="{D47E2586-09A2-8443-97E9-9E1CC8856BFD}" type="datetime1">
               <a:rPr lang="en-US" smtClean="0"/>
-              <a:t>2/22/21</a:t>
+              <a:t>2/24/21</a:t>
             </a:fld>
             <a:endParaRPr lang="en-US"/>
           </a:p>
@@ -2065,7 +2065,7 @@
           <a:p>
             <a:fld id="{E8002B35-DFF4-9049-843D-44A6085D396E}" type="datetime1">
               <a:rPr lang="en-US" smtClean="0"/>
-              <a:t>2/22/21</a:t>
+              <a:t>2/24/21</a:t>
             </a:fld>
             <a:endParaRPr lang="en-US"/>
           </a:p>
@@ -2216,7 +2216,7 @@
           <a:p>
             <a:fld id="{0F057E37-0DE7-3940-BEF3-BD3052280F27}" type="datetime1">
               <a:rPr lang="en-US" smtClean="0"/>
-              <a:t>2/22/21</a:t>
+              <a:t>2/24/21</a:t>
             </a:fld>
             <a:endParaRPr lang="en-US"/>
           </a:p>
@@ -2345,7 +2345,7 @@
           <a:p>
             <a:fld id="{779F7A2C-FB4C-AC44-A88F-A5CBCF0D32EC}" type="datetime1">
               <a:rPr lang="en-US" smtClean="0"/>
-              <a:t>2/22/21</a:t>
+              <a:t>2/24/21</a:t>
             </a:fld>
             <a:endParaRPr lang="en-US"/>
           </a:p>
@@ -2654,7 +2654,7 @@
           <a:p>
             <a:fld id="{F522DC46-DCD4-5941-8454-39336897E19D}" type="datetime1">
               <a:rPr lang="en-US" smtClean="0"/>
-              <a:t>2/22/21</a:t>
+              <a:t>2/24/21</a:t>
             </a:fld>
             <a:endParaRPr lang="en-US"/>
           </a:p>
@@ -3029,14 +3029,14 @@
           </a:ln>
           <a:extLst>
             <a:ext uri="{909E8E84-426E-40dd-AFC4-6F175D3DCCD1}">
-              <a14:hiddenFill xmlns="" xmlns:a14="http://schemas.microsoft.com/office/drawing/2010/main">
+              <a14:hiddenFill xmlns:a14="http://schemas.microsoft.com/office/drawing/2010/main" xmlns="">
                 <a:solidFill>
                   <a:srgbClr val="FFFFFF"/>
                 </a:solidFill>
               </a14:hiddenFill>
             </a:ext>
             <a:ext uri="{91240B29-F687-4f45-9708-019B960494DF}">
-              <a14:hiddenLine xmlns="" xmlns:a14="http://schemas.microsoft.com/office/drawing/2010/main" w="9525">
+              <a14:hiddenLine xmlns:a14="http://schemas.microsoft.com/office/drawing/2010/main" xmlns="" w="9525">
                 <a:solidFill>
                   <a:srgbClr val="000000"/>
                 </a:solidFill>
@@ -3046,7 +3046,7 @@
               </a14:hiddenLine>
             </a:ext>
             <a:ext uri="{FAA26D3D-D897-4be2-8F04-BA451C77F1D7}">
-              <ma14:placeholderFlag xmlns="" xmlns:ma14="http://schemas.microsoft.com/office/mac/drawingml/2011/main" val="1"/>
+              <ma14:placeholderFlag xmlns:ma14="http://schemas.microsoft.com/office/mac/drawingml/2011/main" xmlns="" val="1"/>
             </a:ext>
           </a:extLst>
         </p:spPr>
@@ -3222,7 +3222,7 @@
           <a:p>
             <a:fld id="{04DC5BFA-818F-8D40-A035-7726C59AF3B0}" type="datetime1">
               <a:rPr lang="en-US" smtClean="0"/>
-              <a:t>2/22/21</a:t>
+              <a:t>2/24/21</a:t>
             </a:fld>
             <a:endParaRPr lang="en-US"/>
           </a:p>
@@ -4055,14 +4055,14 @@
           </a:ln>
           <a:extLst>
             <a:ext uri="{909E8E84-426E-40dd-AFC4-6F175D3DCCD1}">
-              <a14:hiddenFill xmlns="" xmlns:a14="http://schemas.microsoft.com/office/drawing/2010/main">
+              <a14:hiddenFill xmlns:a14="http://schemas.microsoft.com/office/drawing/2010/main" xmlns="">
                 <a:solidFill>
                   <a:srgbClr val="FFFFFF"/>
                 </a:solidFill>
               </a14:hiddenFill>
             </a:ext>
             <a:ext uri="{91240B29-F687-4f45-9708-019B960494DF}">
-              <a14:hiddenLine xmlns="" xmlns:a14="http://schemas.microsoft.com/office/drawing/2010/main" w="9525">
+              <a14:hiddenLine xmlns:a14="http://schemas.microsoft.com/office/drawing/2010/main" xmlns="" w="9525">
                 <a:solidFill>
                   <a:srgbClr val="000000"/>
                 </a:solidFill>
@@ -4072,7 +4072,7 @@
               </a14:hiddenLine>
             </a:ext>
             <a:ext uri="{FAA26D3D-D897-4be2-8F04-BA451C77F1D7}">
-              <ma14:placeholderFlag xmlns="" xmlns:ma14="http://schemas.microsoft.com/office/mac/drawingml/2011/main" val="1"/>
+              <ma14:placeholderFlag xmlns:ma14="http://schemas.microsoft.com/office/mac/drawingml/2011/main" xmlns="" val="1"/>
             </a:ext>
           </a:extLst>
         </p:spPr>
@@ -6851,8 +6851,8 @@
           </a:p>
         </p:txBody>
       </p:sp>
-      <mc:AlternateContent xmlns:mc="http://schemas.openxmlformats.org/markup-compatibility/2006">
-        <mc:Choice xmlns:a14="http://schemas.microsoft.com/office/drawing/2010/main" Requires="a14">
+      <mc:AlternateContent xmlns:mc="http://schemas.openxmlformats.org/markup-compatibility/2006" xmlns:a14="http://schemas.microsoft.com/office/drawing/2010/main">
+        <mc:Choice Requires="a14">
           <p:sp>
             <p:nvSpPr>
               <p:cNvPr id="3" name="Content Placeholder 2">
@@ -6899,27 +6899,7 @@
                         <a:latin typeface="Cambria Math" panose="02040503050406030204" pitchFamily="18" charset="0"/>
                         <a:ea typeface="Cambria Math" panose="02040503050406030204" pitchFamily="18" charset="0"/>
                       </a:rPr>
-                      <m:t>𝟐</m:t>
-                    </m:r>
-                    <m:r>
-                      <a:rPr lang="en-US" b="1" i="0" smtClean="0">
-                        <a:solidFill>
-                          <a:srgbClr val="0432FF"/>
-                        </a:solidFill>
-                        <a:latin typeface="Cambria Math" panose="02040503050406030204" pitchFamily="18" charset="0"/>
-                        <a:ea typeface="Cambria Math" panose="02040503050406030204" pitchFamily="18" charset="0"/>
-                      </a:rPr>
-                      <m:t>𝟓</m:t>
-                    </m:r>
-                    <m:r>
-                      <a:rPr lang="en-US" b="1" i="0" smtClean="0">
-                        <a:solidFill>
-                          <a:srgbClr val="0432FF"/>
-                        </a:solidFill>
-                        <a:latin typeface="Cambria Math" panose="02040503050406030204" pitchFamily="18" charset="0"/>
-                        <a:ea typeface="Cambria Math" panose="02040503050406030204" pitchFamily="18" charset="0"/>
-                      </a:rPr>
-                      <m:t>𝟎</m:t>
+                      <m:t>𝟐𝟓𝟎</m:t>
                     </m:r>
                     <m:r>
                       <a:rPr lang="en-US" i="1" smtClean="0">
@@ -6939,17 +6919,7 @@
                         <a:latin typeface="Cambria Math" panose="02040503050406030204" pitchFamily="18" charset="0"/>
                         <a:ea typeface="Cambria Math" panose="02040503050406030204" pitchFamily="18" charset="0"/>
                       </a:rPr>
-                      <m:t>𝟖</m:t>
-                    </m:r>
-                    <m:r>
-                      <a:rPr lang="en-US" b="1" i="1" smtClean="0">
-                        <a:solidFill>
-                          <a:srgbClr val="0432FF"/>
-                        </a:solidFill>
-                        <a:latin typeface="Cambria Math" panose="02040503050406030204" pitchFamily="18" charset="0"/>
-                        <a:ea typeface="Cambria Math" panose="02040503050406030204" pitchFamily="18" charset="0"/>
-                      </a:rPr>
-                      <m:t>𝟎</m:t>
+                      <m:t>𝟖𝟎</m:t>
                     </m:r>
                   </m:oMath>
                 </a14:m>
@@ -6969,7 +6939,7 @@
             </p:txBody>
           </p:sp>
         </mc:Choice>
-        <mc:Fallback>
+        <mc:Fallback xmlns="">
           <p:sp>
             <p:nvSpPr>
               <p:cNvPr id="3" name="Content Placeholder 2">
@@ -7590,7 +7560,7 @@
             <a:pPr lvl="1"/>
             <a:r>
               <a:rPr lang="en-US" dirty="0"/>
-              <a:t>oversampling</a:t>
+              <a:t>Oversampling</a:t>
             </a:r>
           </a:p>
           <a:p>
@@ -8627,7 +8597,35 @@
           <a:p>
             <a:r>
               <a:rPr lang="en-US" dirty="0"/>
-              <a:t>We are working on a paper</a:t>
+              <a:t>Submitted a draft to </a:t>
+            </a:r>
+            <a:r>
+              <a:rPr lang="en-US" dirty="0" err="1"/>
+              <a:t>arxiv</a:t>
+            </a:r>
+            <a:r>
+              <a:rPr lang="en-US" dirty="0"/>
+              <a:t> (going to submit to a journal soon)</a:t>
+            </a:r>
+          </a:p>
+          <a:p>
+            <a:r>
+              <a:rPr lang="en-US" dirty="0"/>
+              <a:t>Possible future extension: add more classes</a:t>
+            </a:r>
+          </a:p>
+          <a:p>
+            <a:pPr lvl="1"/>
+            <a:r>
+              <a:rPr lang="en-US" dirty="0"/>
+              <a:t>use subtypes of AGNs, e.g., BL Lacs and FSRQs;</a:t>
+            </a:r>
+          </a:p>
+          <a:p>
+            <a:pPr lvl="1"/>
+            <a:r>
+              <a:rPr lang="en-US" dirty="0"/>
+              <a:t>can one use all 3FGL and 4FGL classes (there are about 20 classes in total)?</a:t>
             </a:r>
           </a:p>
         </p:txBody>
@@ -11580,7 +11578,7 @@
           <a:p>
             <a:r>
               <a:rPr lang="en-US" dirty="0"/>
-              <a:t>4FGL-DR2 features</a:t>
+              <a:t>4FGL-DR2 feature importance</a:t>
             </a:r>
           </a:p>
         </p:txBody>
@@ -11674,10 +11672,10 @@
       </p:sp>
       <p:pic>
         <p:nvPicPr>
-          <p:cNvPr id="9" name="Picture 8" descr="Text&#10;&#10;Description automatically generated with medium confidence">
-            <a:extLst>
-              <a:ext uri="{FF2B5EF4-FFF2-40B4-BE49-F238E27FC236}">
-                <a16:creationId xmlns:a16="http://schemas.microsoft.com/office/drawing/2014/main" id="{6D7B2DFE-9F42-7140-A56C-4933AB12A965}"/>
+          <p:cNvPr id="7" name="Picture 6" descr="Table&#10;&#10;Description automatically generated">
+            <a:extLst>
+              <a:ext uri="{FF2B5EF4-FFF2-40B4-BE49-F238E27FC236}">
+                <a16:creationId xmlns:a16="http://schemas.microsoft.com/office/drawing/2014/main" id="{3C9D0443-75E0-3344-9D85-ACCE258F4C16}"/>
               </a:ext>
             </a:extLst>
           </p:cNvPr>
@@ -11694,8 +11692,8 @@
         </p:blipFill>
         <p:spPr>
           <a:xfrm>
-            <a:off x="2514600" y="1141414"/>
-            <a:ext cx="2667000" cy="3701955"/>
+            <a:off x="1746250" y="1752600"/>
+            <a:ext cx="5651500" cy="4419600"/>
           </a:xfrm>
           <a:prstGeom prst="rect">
             <a:avLst/>
@@ -12109,9 +12107,10 @@
           <a:lstStyle/>
           <a:p>
             <a:r>
-              <a:rPr lang="en-US" dirty="0"/>
-              <a:t>Some references and our work plan</a:t>
-            </a:r>
+              <a:rPr lang="en-US"/>
+              <a:t>Some references</a:t>
+            </a:r>
+            <a:endParaRPr lang="en-US" dirty="0"/>
           </a:p>
         </p:txBody>
       </p:sp>
@@ -12225,47 +12224,6 @@
                 </a:solidFill>
               </a:rPr>
               <a:t> et al (2016)</a:t>
-            </a:r>
-          </a:p>
-          <a:p>
-            <a:r>
-              <a:rPr lang="en-US" dirty="0"/>
-              <a:t>We use ML for the construction of probabilistic catalogs based on the 3FGL and 4FGL-DR2 catalogs</a:t>
-            </a:r>
-          </a:p>
-          <a:p>
-            <a:pPr lvl="1"/>
-            <a:r>
-              <a:rPr lang="en-US" dirty="0"/>
-              <a:t>Use 2-class (AGN, pulsars) or 3-class (add other sources) classification</a:t>
-            </a:r>
-          </a:p>
-          <a:p>
-            <a:pPr lvl="1"/>
-            <a:r>
-              <a:rPr lang="en-US" dirty="0"/>
-              <a:t>Test predictions for 3FGL using 4FGL-DR2</a:t>
-            </a:r>
-          </a:p>
-          <a:p>
-            <a:pPr lvl="1"/>
-            <a:r>
-              <a:rPr lang="en-US" dirty="0"/>
-              <a:t>Keep results of all ML algorithms (gives syst. uncertainty)</a:t>
-            </a:r>
-          </a:p>
-          <a:p>
-            <a:pPr lvl="1"/>
-            <a:r>
-              <a:rPr lang="en-US" dirty="0"/>
-              <a:t>Show examples of populations studies: distributions as a function of flux, latitude, or longitude</a:t>
-            </a:r>
-          </a:p>
-          <a:p>
-            <a:pPr lvl="2"/>
-            <a:r>
-              <a:rPr lang="en-US" sz="1600" dirty="0"/>
-              <a:t>2-class: correct for presence of other sources (not PSRs or AGNs)</a:t>
             </a:r>
           </a:p>
         </p:txBody>
@@ -13076,7 +13034,7 @@
           <a:p>
             <a:r>
               <a:rPr lang="en-US" dirty="0"/>
-              <a:t>Feature importance for two RF algorithms</a:t>
+              <a:t>Feature importance for RF (50 trees, max depth 6) and BDT (100 trees, max depth 2) algorithms</a:t>
             </a:r>
           </a:p>
           <a:p>
@@ -13118,7 +13076,7 @@
           <a:p>
             <a:r>
               <a:rPr lang="en-US" dirty="0"/>
-              <a:t>Latitude and longitude are the least important</a:t>
+              <a:t>Latitude and longitude are among the least important</a:t>
             </a:r>
           </a:p>
         </p:txBody>
@@ -13184,10 +13142,10 @@
       </p:sp>
       <p:pic>
         <p:nvPicPr>
-          <p:cNvPr id="7" name="Picture 6" descr="Table&#10;&#10;Description automatically generated">
-            <a:extLst>
-              <a:ext uri="{FF2B5EF4-FFF2-40B4-BE49-F238E27FC236}">
-                <a16:creationId xmlns:a16="http://schemas.microsoft.com/office/drawing/2014/main" id="{B27F6F91-6A79-5349-84FC-1C3DDB8AE380}"/>
+          <p:cNvPr id="8" name="Picture 7" descr="Table&#10;&#10;Description automatically generated">
+            <a:extLst>
+              <a:ext uri="{FF2B5EF4-FFF2-40B4-BE49-F238E27FC236}">
+                <a16:creationId xmlns:a16="http://schemas.microsoft.com/office/drawing/2014/main" id="{BDDFA860-5897-8748-9493-A9366D80B802}"/>
               </a:ext>
             </a:extLst>
           </p:cNvPr>
@@ -13204,8 +13162,8 @@
         </p:blipFill>
         <p:spPr>
           <a:xfrm>
-            <a:off x="990600" y="1930400"/>
-            <a:ext cx="6337300" cy="2997200"/>
+            <a:off x="1524000" y="2209007"/>
+            <a:ext cx="5295900" cy="3124200"/>
           </a:xfrm>
           <a:prstGeom prst="rect">
             <a:avLst/>
@@ -13306,7 +13264,7 @@
             <a:pPr lvl="1"/>
             <a:r>
               <a:rPr lang="en-US" dirty="0"/>
-              <a:t>PSRs are much less numerous as AGNs (the classes are imbalanced)</a:t>
+              <a:t>PSRs are much less numerous that AGNs</a:t>
             </a:r>
           </a:p>
           <a:p>
@@ -13413,7 +13371,7 @@
         </p:blipFill>
         <p:spPr>
           <a:xfrm>
-            <a:off x="0" y="3599657"/>
+            <a:off x="0" y="3276600"/>
             <a:ext cx="4481829" cy="2801143"/>
           </a:xfrm>
           <a:prstGeom prst="rect">
@@ -13443,7 +13401,7 @@
         </p:blipFill>
         <p:spPr>
           <a:xfrm>
-            <a:off x="4312285" y="3599657"/>
+            <a:off x="4312285" y="3276600"/>
             <a:ext cx="4481829" cy="2801143"/>
           </a:xfrm>
           <a:prstGeom prst="rect">

</xml_diff>

<commit_message>
minor change to backup slides of gamma group presentation
</commit_message>
<xml_diff>
--- a/presentations/2021-02-Fermi_prob_catalog_gamma_group.pptx
+++ b/presentations/2021-02-Fermi_prob_catalog_gamma_group.pptx
@@ -11606,8 +11606,56 @@
           <a:p>
             <a:r>
               <a:rPr lang="en-US" dirty="0"/>
-              <a:t>Features</a:t>
-            </a:r>
+              <a:t>Feature </a:t>
+            </a:r>
+            <a:r>
+              <a:rPr lang="en-US" dirty="0" err="1"/>
+              <a:t>importantces</a:t>
+            </a:r>
+            <a:r>
+              <a:rPr lang="en-US" dirty="0"/>
+              <a:t> for RF (50 trees, max depth 6) and BDT (100 trees, max depth 2) algorithms</a:t>
+            </a:r>
+          </a:p>
+          <a:p>
+            <a:pPr lvl="1"/>
+            <a:r>
+              <a:rPr lang="en-US" dirty="0"/>
+              <a:t>Similarly to 3FGL, curvature significance is the most important feature,</a:t>
+            </a:r>
+            <a:br>
+              <a:rPr lang="en-US" dirty="0"/>
+            </a:br>
+            <a:r>
+              <a:rPr lang="en-US" dirty="0"/>
+              <a:t>while GLAT and </a:t>
+            </a:r>
+            <a:br>
+              <a:rPr lang="en-US" dirty="0"/>
+            </a:br>
+            <a:r>
+              <a:rPr lang="en-US" dirty="0"/>
+              <a:t>GLON are among</a:t>
+            </a:r>
+            <a:br>
+              <a:rPr lang="en-US" dirty="0"/>
+            </a:br>
+            <a:r>
+              <a:rPr lang="en-US" dirty="0"/>
+              <a:t>the </a:t>
+            </a:r>
+            <a:r>
+              <a:rPr lang="en-US"/>
+              <a:t>least significant</a:t>
+            </a:r>
+            <a:br>
+              <a:rPr lang="en-US"/>
+            </a:br>
+            <a:r>
+              <a:rPr lang="en-US"/>
+              <a:t>ones</a:t>
+            </a:r>
+            <a:endParaRPr lang="en-US" dirty="0"/>
           </a:p>
         </p:txBody>
       </p:sp>
@@ -11672,10 +11720,10 @@
       </p:sp>
       <p:pic>
         <p:nvPicPr>
-          <p:cNvPr id="7" name="Picture 6" descr="Table&#10;&#10;Description automatically generated">
-            <a:extLst>
-              <a:ext uri="{FF2B5EF4-FFF2-40B4-BE49-F238E27FC236}">
-                <a16:creationId xmlns:a16="http://schemas.microsoft.com/office/drawing/2014/main" id="{3C9D0443-75E0-3344-9D85-ACCE258F4C16}"/>
+          <p:cNvPr id="10" name="Picture 9" descr="Table&#10;&#10;Description automatically generated">
+            <a:extLst>
+              <a:ext uri="{FF2B5EF4-FFF2-40B4-BE49-F238E27FC236}">
+                <a16:creationId xmlns:a16="http://schemas.microsoft.com/office/drawing/2014/main" id="{A15D7315-A91F-764E-AF0E-3295A1757813}"/>
               </a:ext>
             </a:extLst>
           </p:cNvPr>
@@ -11692,8 +11740,8 @@
         </p:blipFill>
         <p:spPr>
           <a:xfrm>
-            <a:off x="1746250" y="1752600"/>
-            <a:ext cx="5651500" cy="4419600"/>
+            <a:off x="4114800" y="2362200"/>
+            <a:ext cx="4709714" cy="3765550"/>
           </a:xfrm>
           <a:prstGeom prst="rect">
             <a:avLst/>
@@ -12107,10 +12155,9 @@
           <a:lstStyle/>
           <a:p>
             <a:r>
-              <a:rPr lang="en-US"/>
+              <a:rPr lang="en-US" dirty="0"/>
               <a:t>Some references</a:t>
             </a:r>
-            <a:endParaRPr lang="en-US" dirty="0"/>
           </a:p>
         </p:txBody>
       </p:sp>

</xml_diff>